<commit_message>
mise à jour du plan de la semaine 9
</commit_message>
<xml_diff>
--- a/CONTENTS.pptx
+++ b/CONTENTS.pptx
@@ -138,7 +138,7 @@
   </p:defaultTextStyle>
   <p:extLst>
     <p:ext uri="{EFAFB233-063F-42B5-8137-9DF3F51BA10A}">
-      <p15:sldGuideLst xmlns:p15="http://schemas.microsoft.com/office/powerpoint/2012/main" xmlns="">
+      <p15:sldGuideLst xmlns:p15="http://schemas.microsoft.com/office/powerpoint/2012/main">
         <p15:guide id="1" orient="horz" pos="1620">
           <p15:clr>
             <a:srgbClr val="A4A3A4"/>
@@ -152,7 +152,7 @@
       </p15:sldGuideLst>
     </p:ext>
     <p:ext uri="{2D200454-40CA-4A62-9FC3-DE9A4176ACB9}">
-      <p15:notesGuideLst xmlns:p15="http://schemas.microsoft.com/office/powerpoint/2012/main" xmlns="">
+      <p15:notesGuideLst xmlns:p15="http://schemas.microsoft.com/office/powerpoint/2012/main">
         <p15:guide id="1" orient="horz" pos="2880">
           <p15:clr>
             <a:srgbClr val="A4A3A4"/>
@@ -324,7 +324,7 @@
           <a:p>
             <a:fld id="{13FF1EAC-B98F-1343-A48C-39D918BE8CF9}" type="slidenum">
               <a:rPr lang="fr-FR" smtClean="0"/>
-              <a:t>‹#›</a:t>
+              <a:t>‹N°›</a:t>
             </a:fld>
             <a:endParaRPr lang="fr-FR" dirty="0"/>
           </a:p>
@@ -583,7 +583,7 @@
           <a:p>
             <a:fld id="{E18DCD8E-1A57-4C46-931A-04A12B7DFB44}" type="slidenum">
               <a:rPr lang="fr-FR" smtClean="0"/>
-              <a:t>‹#›</a:t>
+              <a:t>‹N°›</a:t>
             </a:fld>
             <a:endParaRPr lang="fr-FR"/>
           </a:p>
@@ -5067,7 +5067,7 @@
   <p:timing>
     <p:tnLst>
       <p:par>
-        <p:cTn xmlns:p14="http://schemas.microsoft.com/office/powerpoint/2010/main" id="1" dur="indefinite" restart="never" nodeType="tmRoot"/>
+        <p:cTn id="1" dur="indefinite" restart="never" nodeType="tmRoot"/>
       </p:par>
     </p:tnLst>
   </p:timing>
@@ -5159,7 +5159,7 @@
   <p:timing>
     <p:tnLst>
       <p:par>
-        <p:cTn xmlns:p14="http://schemas.microsoft.com/office/powerpoint/2010/main" id="1" dur="indefinite" restart="never" nodeType="tmRoot"/>
+        <p:cTn id="1" dur="indefinite" restart="never" nodeType="tmRoot"/>
       </p:par>
     </p:tnLst>
   </p:timing>
@@ -5710,7 +5710,7 @@
   <p:timing>
     <p:tnLst>
       <p:par>
-        <p:cTn xmlns:p14="http://schemas.microsoft.com/office/powerpoint/2010/main" id="1" dur="indefinite" restart="never" nodeType="tmRoot"/>
+        <p:cTn id="1" dur="indefinite" restart="never" nodeType="tmRoot"/>
       </p:par>
     </p:tnLst>
   </p:timing>
@@ -6358,7 +6358,7 @@
   <p:timing>
     <p:tnLst>
       <p:par>
-        <p:cTn xmlns:p14="http://schemas.microsoft.com/office/powerpoint/2010/main" id="1" dur="indefinite" restart="never" nodeType="tmRoot"/>
+        <p:cTn id="1" dur="indefinite" restart="never" nodeType="tmRoot"/>
       </p:par>
     </p:tnLst>
   </p:timing>
@@ -6450,7 +6450,7 @@
   <p:timing>
     <p:tnLst>
       <p:par>
-        <p:cTn xmlns:p14="http://schemas.microsoft.com/office/powerpoint/2010/main" id="1" dur="indefinite" restart="never" nodeType="tmRoot"/>
+        <p:cTn id="1" dur="indefinite" restart="never" nodeType="tmRoot"/>
       </p:par>
     </p:tnLst>
   </p:timing>
@@ -7001,7 +7001,7 @@
   <p:timing>
     <p:tnLst>
       <p:par>
-        <p:cTn xmlns:p14="http://schemas.microsoft.com/office/powerpoint/2010/main" id="1" dur="indefinite" restart="never" nodeType="tmRoot"/>
+        <p:cTn id="1" dur="indefinite" restart="never" nodeType="tmRoot"/>
       </p:par>
     </p:tnLst>
   </p:timing>
@@ -7200,11 +7200,6 @@
               </a:rPr>
               <a:t>itération</a:t>
             </a:r>
-            <a:endParaRPr lang="fr-FR" b="1" dirty="0" smtClean="0">
-              <a:latin typeface="Calibri" charset="0"/>
-              <a:ea typeface="Calibri" charset="0"/>
-              <a:cs typeface="Calibri" charset="0"/>
-            </a:endParaRPr>
           </a:p>
           <a:p>
             <a:pPr marL="457200" indent="-457200">
@@ -7417,15 +7412,7 @@
                 <a:ea typeface="Calibri" charset="0"/>
                 <a:cs typeface="Calibri" charset="0"/>
               </a:rPr>
-              <a:t>et </a:t>
-            </a:r>
-            <a:r>
-              <a:rPr lang="fr-FR" dirty="0" smtClean="0">
-                <a:latin typeface="Calibri" charset="0"/>
-                <a:ea typeface="Calibri" charset="0"/>
-                <a:cs typeface="Calibri" charset="0"/>
-              </a:rPr>
-              <a:t>espaces de nommage</a:t>
+              <a:t>et espaces de nommage</a:t>
             </a:r>
           </a:p>
         </p:txBody>
@@ -7728,7 +7715,7 @@
   <p:timing>
     <p:tnLst>
       <p:par>
-        <p:cTn xmlns:p14="http://schemas.microsoft.com/office/powerpoint/2010/main" id="1" dur="indefinite" restart="never" nodeType="tmRoot"/>
+        <p:cTn id="1" dur="indefinite" restart="never" nodeType="tmRoot"/>
       </p:par>
     </p:tnLst>
   </p:timing>
@@ -7820,7 +7807,7 @@
   <p:timing>
     <p:tnLst>
       <p:par>
-        <p:cTn xmlns:p14="http://schemas.microsoft.com/office/powerpoint/2010/main" id="1" dur="indefinite" restart="never" nodeType="tmRoot"/>
+        <p:cTn id="1" dur="indefinite" restart="never" nodeType="tmRoot"/>
       </p:par>
     </p:tnLst>
   </p:timing>
@@ -8371,7 +8358,7 @@
   <p:timing>
     <p:tnLst>
       <p:par>
-        <p:cTn xmlns:p14="http://schemas.microsoft.com/office/powerpoint/2010/main" id="1" dur="indefinite" restart="never" nodeType="tmRoot"/>
+        <p:cTn id="1" dur="indefinite" restart="never" nodeType="tmRoot"/>
       </p:par>
     </p:tnLst>
   </p:timing>
@@ -8986,7 +8973,7 @@
   <p:timing>
     <p:tnLst>
       <p:par>
-        <p:cTn xmlns:p14="http://schemas.microsoft.com/office/powerpoint/2010/main" id="1" dur="indefinite" restart="never" nodeType="tmRoot"/>
+        <p:cTn id="1" dur="indefinite" restart="never" nodeType="tmRoot"/>
       </p:par>
     </p:tnLst>
   </p:timing>
@@ -9078,7 +9065,7 @@
   <p:timing>
     <p:tnLst>
       <p:par>
-        <p:cTn xmlns:p14="http://schemas.microsoft.com/office/powerpoint/2010/main" id="1" dur="indefinite" restart="never" nodeType="tmRoot"/>
+        <p:cTn id="1" dur="indefinite" restart="never" nodeType="tmRoot"/>
       </p:par>
     </p:tnLst>
   </p:timing>
@@ -9629,7 +9616,7 @@
   <p:timing>
     <p:tnLst>
       <p:par>
-        <p:cTn xmlns:p14="http://schemas.microsoft.com/office/powerpoint/2010/main" id="1" dur="indefinite" restart="never" nodeType="tmRoot"/>
+        <p:cTn id="1" dur="indefinite" restart="never" nodeType="tmRoot"/>
       </p:par>
     </p:tnLst>
   </p:timing>
@@ -10180,7 +10167,7 @@
   <p:timing>
     <p:tnLst>
       <p:par>
-        <p:cTn xmlns:p14="http://schemas.microsoft.com/office/powerpoint/2010/main" id="1" dur="indefinite" restart="never" nodeType="tmRoot"/>
+        <p:cTn id="1" dur="indefinite" restart="never" nodeType="tmRoot"/>
       </p:par>
     </p:tnLst>
   </p:timing>
@@ -10326,7 +10313,6 @@
               <a:rPr lang="fr-FR" b="1" dirty="0" smtClean="0"/>
               <a:t>outils</a:t>
             </a:r>
-            <a:endParaRPr lang="fr-FR" b="1" dirty="0" smtClean="0"/>
           </a:p>
           <a:p>
             <a:pPr marL="457200" indent="-457200">
@@ -10351,7 +10337,6 @@
               <a:rPr lang="fr-FR" dirty="0" smtClean="0"/>
               <a:t> </a:t>
             </a:r>
-            <a:endParaRPr lang="fr-FR" dirty="0" smtClean="0"/>
           </a:p>
           <a:p>
             <a:pPr marL="457200" indent="-457200">
@@ -10372,10 +10357,6 @@
               </a:rPr>
               <a:t>andas </a:t>
             </a:r>
-            <a:endParaRPr lang="fr-FR" dirty="0" smtClean="0">
-              <a:latin typeface="Courier New"/>
-              <a:cs typeface="Courier New"/>
-            </a:endParaRPr>
           </a:p>
           <a:p>
             <a:pPr marL="457200" indent="-457200">
@@ -10693,7 +10674,7 @@
   <p:timing>
     <p:tnLst>
       <p:par>
-        <p:cTn xmlns:p14="http://schemas.microsoft.com/office/powerpoint/2010/main" id="1" dur="indefinite" restart="never" nodeType="tmRoot"/>
+        <p:cTn id="1" dur="indefinite" restart="never" nodeType="tmRoot"/>
       </p:par>
     </p:tnLst>
   </p:timing>
@@ -10785,7 +10766,7 @@
   <p:timing>
     <p:tnLst>
       <p:par>
-        <p:cTn xmlns:p14="http://schemas.microsoft.com/office/powerpoint/2010/main" id="1" dur="indefinite" restart="never" nodeType="tmRoot"/>
+        <p:cTn id="1" dur="indefinite" restart="never" nodeType="tmRoot"/>
       </p:par>
     </p:tnLst>
   </p:timing>
@@ -11336,7 +11317,7 @@
   <p:timing>
     <p:tnLst>
       <p:par>
-        <p:cTn xmlns:p14="http://schemas.microsoft.com/office/powerpoint/2010/main" id="1" dur="indefinite" restart="never" nodeType="tmRoot"/>
+        <p:cTn id="1" dur="indefinite" restart="never" nodeType="tmRoot"/>
       </p:par>
     </p:tnLst>
   </p:timing>
@@ -11943,7 +11924,7 @@
   <p:timing>
     <p:tnLst>
       <p:par>
-        <p:cTn xmlns:p14="http://schemas.microsoft.com/office/powerpoint/2010/main" id="1" dur="indefinite" restart="never" nodeType="tmRoot"/>
+        <p:cTn id="1" dur="indefinite" restart="never" nodeType="tmRoot"/>
       </p:par>
     </p:tnLst>
   </p:timing>
@@ -12035,7 +12016,7 @@
   <p:timing>
     <p:tnLst>
       <p:par>
-        <p:cTn xmlns:p14="http://schemas.microsoft.com/office/powerpoint/2010/main" id="1" dur="indefinite" restart="never" nodeType="tmRoot"/>
+        <p:cTn id="1" dur="indefinite" restart="never" nodeType="tmRoot"/>
       </p:par>
     </p:tnLst>
   </p:timing>
@@ -12586,7 +12567,7 @@
   <p:timing>
     <p:tnLst>
       <p:par>
-        <p:cTn xmlns:p14="http://schemas.microsoft.com/office/powerpoint/2010/main" id="1" dur="indefinite" restart="never" nodeType="tmRoot"/>
+        <p:cTn id="1" dur="indefinite" restart="never" nodeType="tmRoot"/>
       </p:par>
     </p:tnLst>
   </p:timing>
@@ -12756,7 +12737,11 @@
             </a:pPr>
             <a:r>
               <a:rPr lang="fr-FR" dirty="0" smtClean="0"/>
-              <a:t>Les décorateurs</a:t>
+              <a:t>Les </a:t>
+            </a:r>
+            <a:r>
+              <a:rPr lang="fr-FR" dirty="0" smtClean="0"/>
+              <a:t>décorateurs</a:t>
             </a:r>
           </a:p>
           <a:p>
@@ -12765,20 +12750,14 @@
               <a:buAutoNum type="arabicPeriod"/>
             </a:pPr>
             <a:r>
-              <a:rPr lang="fr-FR" dirty="0" err="1" smtClean="0">
-                <a:latin typeface="Courier New"/>
-                <a:cs typeface="Courier New"/>
-              </a:rPr>
-              <a:t>property</a:t>
-            </a:r>
-            <a:r>
-              <a:rPr lang="fr-FR" dirty="0" smtClean="0"/>
-              <a:t> </a:t>
-            </a:r>
-            <a:r>
-              <a:rPr lang="fr-FR" dirty="0"/>
-              <a:t>et descripteurs</a:t>
-            </a:r>
+              <a:rPr lang="fr-FR" dirty="0">
+                <a:latin typeface="Calibri" charset="0"/>
+                <a:ea typeface="Calibri" charset="0"/>
+                <a:cs typeface="Calibri" charset="0"/>
+              </a:rPr>
+              <a:t>Les clôtures de fonctions</a:t>
+            </a:r>
+            <a:endParaRPr lang="fr-FR" dirty="0" smtClean="0"/>
           </a:p>
           <a:p>
             <a:pPr marL="457200" indent="-457200">
@@ -12786,18 +12765,24 @@
               <a:buAutoNum type="arabicPeriod"/>
             </a:pPr>
             <a:r>
+              <a:rPr lang="fr-FR" dirty="0" err="1" smtClean="0">
+                <a:latin typeface="Courier New"/>
+                <a:cs typeface="Courier New"/>
+              </a:rPr>
+              <a:t>property</a:t>
+            </a:r>
+            <a:r>
               <a:rPr lang="fr-FR" dirty="0" smtClean="0"/>
-              <a:t>Les </a:t>
-            </a:r>
-            <a:r>
-              <a:rPr lang="fr-FR" dirty="0" err="1"/>
-              <a:t>métaclasses</a:t>
+              <a:t> </a:t>
             </a:r>
             <a:r>
               <a:rPr lang="fr-FR" dirty="0"/>
-              <a:t> </a:t>
-            </a:r>
-            <a:endParaRPr lang="fr-FR" dirty="0" smtClean="0"/>
+              <a:t>et </a:t>
+            </a:r>
+            <a:r>
+              <a:rPr lang="fr-FR" dirty="0" smtClean="0"/>
+              <a:t>descripteurs</a:t>
+            </a:r>
           </a:p>
           <a:p>
             <a:pPr marL="457200" indent="-457200">
@@ -12805,22 +12790,143 @@
               <a:buAutoNum type="arabicPeriod"/>
             </a:pPr>
             <a:r>
+              <a:rPr lang="fr-FR" dirty="0" smtClean="0">
+                <a:latin typeface="Courier New" panose="02070309020205020404" pitchFamily="49" charset="0"/>
+                <a:ea typeface="Calibri" charset="0"/>
+                <a:cs typeface="Courier New" panose="02070309020205020404" pitchFamily="49" charset="0"/>
+              </a:rPr>
+              <a:t>__</a:t>
+            </a:r>
+            <a:r>
+              <a:rPr lang="fr-FR" dirty="0" err="1">
+                <a:latin typeface="Courier New" panose="02070309020205020404" pitchFamily="49" charset="0"/>
+                <a:ea typeface="Calibri" charset="0"/>
+                <a:cs typeface="Courier New" panose="02070309020205020404" pitchFamily="49" charset="0"/>
+              </a:rPr>
+              <a:t>getattribute</a:t>
+            </a:r>
+            <a:r>
+              <a:rPr lang="fr-FR" dirty="0" smtClean="0">
+                <a:latin typeface="Courier New" panose="02070309020205020404" pitchFamily="49" charset="0"/>
+                <a:ea typeface="Calibri" charset="0"/>
+                <a:cs typeface="Courier New" panose="02070309020205020404" pitchFamily="49" charset="0"/>
+              </a:rPr>
+              <a:t>__</a:t>
+            </a:r>
+            <a:r>
+              <a:rPr lang="fr-FR" dirty="0" smtClean="0">
+                <a:latin typeface="Calibri" charset="0"/>
+                <a:ea typeface="Calibri" charset="0"/>
+                <a:cs typeface="Calibri" charset="0"/>
+              </a:rPr>
+              <a:t>, </a:t>
+            </a:r>
+            <a:r>
+              <a:rPr lang="fr-FR" dirty="0" smtClean="0">
+                <a:latin typeface="Courier New" panose="02070309020205020404" pitchFamily="49" charset="0"/>
+                <a:ea typeface="Calibri" charset="0"/>
+                <a:cs typeface="Courier New" panose="02070309020205020404" pitchFamily="49" charset="0"/>
+              </a:rPr>
+              <a:t>__</a:t>
+            </a:r>
+            <a:r>
+              <a:rPr lang="fr-FR" dirty="0" err="1">
+                <a:latin typeface="Courier New" panose="02070309020205020404" pitchFamily="49" charset="0"/>
+                <a:ea typeface="Calibri" charset="0"/>
+                <a:cs typeface="Courier New" panose="02070309020205020404" pitchFamily="49" charset="0"/>
+              </a:rPr>
+              <a:t>getattr</a:t>
+            </a:r>
+            <a:r>
+              <a:rPr lang="fr-FR" dirty="0" smtClean="0">
+                <a:latin typeface="Courier New" panose="02070309020205020404" pitchFamily="49" charset="0"/>
+                <a:ea typeface="Calibri" charset="0"/>
+                <a:cs typeface="Courier New" panose="02070309020205020404" pitchFamily="49" charset="0"/>
+              </a:rPr>
+              <a:t>__</a:t>
+            </a:r>
+            <a:r>
+              <a:rPr lang="fr-FR" dirty="0" smtClean="0">
+                <a:latin typeface="Calibri" charset="0"/>
+                <a:ea typeface="Calibri" charset="0"/>
+                <a:cs typeface="Calibri" charset="0"/>
+              </a:rPr>
+              <a:t> </a:t>
+            </a:r>
+            <a:r>
+              <a:rPr lang="fr-FR" dirty="0">
+                <a:latin typeface="Calibri" charset="0"/>
+                <a:ea typeface="Calibri" charset="0"/>
+                <a:cs typeface="Calibri" charset="0"/>
+              </a:rPr>
+              <a:t>et </a:t>
+            </a:r>
+            <a:r>
+              <a:rPr lang="fr-FR" dirty="0" smtClean="0">
+                <a:latin typeface="Courier New" panose="02070309020205020404" pitchFamily="49" charset="0"/>
+                <a:ea typeface="Calibri" charset="0"/>
+                <a:cs typeface="Courier New" panose="02070309020205020404" pitchFamily="49" charset="0"/>
+              </a:rPr>
+              <a:t>__</a:t>
+            </a:r>
+            <a:r>
+              <a:rPr lang="fr-FR" dirty="0" err="1">
+                <a:latin typeface="Courier New" panose="02070309020205020404" pitchFamily="49" charset="0"/>
+                <a:ea typeface="Calibri" charset="0"/>
+                <a:cs typeface="Courier New" panose="02070309020205020404" pitchFamily="49" charset="0"/>
+              </a:rPr>
+              <a:t>setattr</a:t>
+            </a:r>
+            <a:r>
+              <a:rPr lang="fr-FR" dirty="0" smtClean="0">
+                <a:latin typeface="Courier New" panose="02070309020205020404" pitchFamily="49" charset="0"/>
+                <a:ea typeface="Calibri" charset="0"/>
+                <a:cs typeface="Courier New" panose="02070309020205020404" pitchFamily="49" charset="0"/>
+              </a:rPr>
+              <a:t>__</a:t>
+            </a:r>
+            <a:endParaRPr lang="fr-FR" dirty="0">
+              <a:latin typeface="Courier New" panose="02070309020205020404" pitchFamily="49" charset="0"/>
+              <a:cs typeface="Courier New" panose="02070309020205020404" pitchFamily="49" charset="0"/>
+            </a:endParaRPr>
+          </a:p>
+          <a:p>
+            <a:pPr marL="457200" indent="-457200">
+              <a:buFont typeface="+mj-lt"/>
+              <a:buAutoNum type="arabicPeriod"/>
+            </a:pPr>
+            <a:r>
+              <a:rPr lang="fr-FR" dirty="0" smtClean="0"/>
+              <a:t>Les </a:t>
+            </a:r>
+            <a:r>
+              <a:rPr lang="fr-FR" dirty="0" err="1"/>
+              <a:t>métaclasses</a:t>
+            </a:r>
+            <a:r>
+              <a:rPr lang="fr-FR" dirty="0"/>
+              <a:t> </a:t>
+            </a:r>
+            <a:endParaRPr lang="fr-FR" dirty="0" smtClean="0"/>
+          </a:p>
+          <a:p>
+            <a:pPr marL="457200" indent="-457200">
+              <a:buFont typeface="+mj-lt"/>
+              <a:buAutoNum type="arabicPeriod"/>
+            </a:pPr>
+            <a:r>
               <a:rPr lang="fr-FR" dirty="0" smtClean="0"/>
               <a:t>Conclusion </a:t>
             </a:r>
             <a:r>
-              <a:rPr lang="fr-FR" dirty="0"/>
+              <a:rPr lang="fr-FR"/>
               <a:t>du </a:t>
             </a:r>
             <a:r>
-              <a:rPr lang="fr-FR" dirty="0" smtClean="0"/>
+              <a:rPr lang="fr-FR" smtClean="0"/>
               <a:t>MOOC</a:t>
             </a:r>
-            <a:endParaRPr lang="fr-FR" b="1" dirty="0" smtClean="0">
-              <a:latin typeface="Calibri" charset="0"/>
-              <a:ea typeface="Calibri" charset="0"/>
-              <a:cs typeface="Calibri" charset="0"/>
-            </a:endParaRPr>
+            <a:endParaRPr lang="fr-FR" dirty="0" smtClean="0"/>
           </a:p>
         </p:txBody>
       </p:sp>
@@ -13122,7 +13228,7 @@
   <p:timing>
     <p:tnLst>
       <p:par>
-        <p:cTn xmlns:p14="http://schemas.microsoft.com/office/powerpoint/2010/main" id="1" dur="indefinite" restart="never" nodeType="tmRoot"/>
+        <p:cTn id="1" dur="indefinite" restart="never" nodeType="tmRoot"/>
       </p:par>
     </p:tnLst>
   </p:timing>
@@ -13289,10 +13395,6 @@
               </a:rPr>
               <a:t>?</a:t>
             </a:r>
-            <a:endParaRPr lang="fr-FR" dirty="0" smtClean="0">
-              <a:latin typeface="Calibri" panose="020F0502020204030204" pitchFamily="34" charset="0"/>
-              <a:cs typeface="Calibri" panose="020F0502020204030204" pitchFamily="34" charset="0"/>
-            </a:endParaRPr>
           </a:p>
           <a:p>
             <a:pPr marL="457200" indent="-457200">
@@ -13304,19 +13406,8 @@
                 <a:latin typeface="Calibri" panose="020F0502020204030204" pitchFamily="34" charset="0"/>
                 <a:cs typeface="Calibri" panose="020F0502020204030204" pitchFamily="34" charset="0"/>
               </a:rPr>
-              <a:t>Interpr</a:t>
-            </a:r>
-            <a:r>
-              <a:rPr lang="fr-FR" dirty="0" smtClean="0">
-                <a:latin typeface="Calibri" panose="020F0502020204030204" pitchFamily="34" charset="0"/>
-                <a:cs typeface="Calibri" panose="020F0502020204030204" pitchFamily="34" charset="0"/>
-              </a:rPr>
-              <a:t>éteur et IDLE</a:t>
-            </a:r>
-            <a:endParaRPr lang="fr-FR" dirty="0" smtClean="0">
-              <a:latin typeface="Calibri" panose="020F0502020204030204" pitchFamily="34" charset="0"/>
-              <a:cs typeface="Calibri" panose="020F0502020204030204" pitchFamily="34" charset="0"/>
-            </a:endParaRPr>
+              <a:t>Interpréteur et IDLE</a:t>
+            </a:r>
           </a:p>
           <a:p>
             <a:pPr marL="457200" indent="-457200">
@@ -13328,14 +13419,7 @@
                 <a:latin typeface="Calibri" panose="020F0502020204030204" pitchFamily="34" charset="0"/>
                 <a:cs typeface="Calibri" panose="020F0502020204030204" pitchFamily="34" charset="0"/>
               </a:rPr>
-              <a:t>Les </a:t>
-            </a:r>
-            <a:r>
-              <a:rPr lang="fr-FR" dirty="0" smtClean="0">
-                <a:latin typeface="Calibri" panose="020F0502020204030204" pitchFamily="34" charset="0"/>
-                <a:cs typeface="Calibri" panose="020F0502020204030204" pitchFamily="34" charset="0"/>
-              </a:rPr>
-              <a:t>notebooks</a:t>
+              <a:t>Les notebooks</a:t>
             </a:r>
           </a:p>
           <a:p>
@@ -13683,7 +13767,7 @@
   <p:timing>
     <p:tnLst>
       <p:par>
-        <p:cTn xmlns:p14="http://schemas.microsoft.com/office/powerpoint/2010/main" id="1" dur="indefinite" restart="never" nodeType="tmRoot"/>
+        <p:cTn id="1" dur="indefinite" restart="never" nodeType="tmRoot"/>
       </p:par>
     </p:tnLst>
   </p:timing>
@@ -13775,7 +13859,7 @@
   <p:timing>
     <p:tnLst>
       <p:par>
-        <p:cTn xmlns:p14="http://schemas.microsoft.com/office/powerpoint/2010/main" id="1" dur="indefinite" restart="never" nodeType="tmRoot"/>
+        <p:cTn id="1" dur="indefinite" restart="never" nodeType="tmRoot"/>
       </p:par>
     </p:tnLst>
   </p:timing>
@@ -14326,7 +14410,7 @@
   <p:timing>
     <p:tnLst>
       <p:par>
-        <p:cTn xmlns:p14="http://schemas.microsoft.com/office/powerpoint/2010/main" id="1" dur="indefinite" restart="never" nodeType="tmRoot"/>
+        <p:cTn id="1" dur="indefinite" restart="never" nodeType="tmRoot"/>
       </p:par>
     </p:tnLst>
   </p:timing>
@@ -14458,11 +14542,6 @@
               </a:rPr>
               <a:t>Unicode </a:t>
             </a:r>
-            <a:endParaRPr lang="fr-FR" b="1" dirty="0" smtClean="0">
-              <a:latin typeface="Calibri" charset="0"/>
-              <a:ea typeface="Calibri" charset="0"/>
-              <a:cs typeface="Calibri" charset="0"/>
-            </a:endParaRPr>
           </a:p>
           <a:p>
             <a:pPr marL="457200" indent="-457200">
@@ -14548,15 +14627,7 @@
                 <a:ea typeface="Calibri" charset="0"/>
                 <a:cs typeface="Calibri" charset="0"/>
               </a:rPr>
-              <a:t> et </a:t>
-            </a:r>
-            <a:r>
-              <a:rPr lang="fr-FR" sz="2200" dirty="0" smtClean="0">
-                <a:latin typeface="Calibri" charset="0"/>
-                <a:ea typeface="Calibri" charset="0"/>
-                <a:cs typeface="Calibri" charset="0"/>
-              </a:rPr>
-              <a:t>à la syntaxe</a:t>
+              <a:t> et à la syntaxe</a:t>
             </a:r>
             <a:endParaRPr lang="fr-FR" sz="2200" dirty="0">
               <a:latin typeface="Calibri" charset="0"/>
@@ -14962,7 +15033,7 @@
   <p:timing>
     <p:tnLst>
       <p:par>
-        <p:cTn xmlns:p14="http://schemas.microsoft.com/office/powerpoint/2010/main" id="1" dur="indefinite" restart="never" nodeType="tmRoot"/>
+        <p:cTn id="1" dur="indefinite" restart="never" nodeType="tmRoot"/>
       </p:par>
     </p:tnLst>
   </p:timing>
@@ -15054,7 +15125,7 @@
   <p:timing>
     <p:tnLst>
       <p:par>
-        <p:cTn xmlns:p14="http://schemas.microsoft.com/office/powerpoint/2010/main" id="1" dur="indefinite" restart="never" nodeType="tmRoot"/>
+        <p:cTn id="1" dur="indefinite" restart="never" nodeType="tmRoot"/>
       </p:par>
     </p:tnLst>
   </p:timing>
@@ -15605,7 +15676,7 @@
   <p:timing>
     <p:tnLst>
       <p:par>
-        <p:cTn xmlns:p14="http://schemas.microsoft.com/office/powerpoint/2010/main" id="1" dur="indefinite" restart="never" nodeType="tmRoot"/>
+        <p:cTn id="1" dur="indefinite" restart="never" nodeType="tmRoot"/>
       </p:par>
     </p:tnLst>
   </p:timing>
@@ -16240,7 +16311,7 @@
   <p:timing>
     <p:tnLst>
       <p:par>
-        <p:cTn xmlns:p14="http://schemas.microsoft.com/office/powerpoint/2010/main" id="1" dur="indefinite" restart="never" nodeType="tmRoot"/>
+        <p:cTn id="1" dur="indefinite" restart="never" nodeType="tmRoot"/>
       </p:par>
     </p:tnLst>
   </p:timing>

</xml_diff>

<commit_message>
moved the metaclasse to w9-s5
</commit_message>
<xml_diff>
--- a/CONTENTS.pptx
+++ b/CONTENTS.pptx
@@ -12737,11 +12737,7 @@
             </a:pPr>
             <a:r>
               <a:rPr lang="fr-FR" dirty="0" smtClean="0"/>
-              <a:t>Les </a:t>
-            </a:r>
-            <a:r>
-              <a:rPr lang="fr-FR" dirty="0" smtClean="0"/>
-              <a:t>décorateurs</a:t>
+              <a:t>Les décorateurs</a:t>
             </a:r>
           </a:p>
           <a:p>
@@ -12790,6 +12786,24 @@
               <a:buAutoNum type="arabicPeriod"/>
             </a:pPr>
             <a:r>
+              <a:rPr lang="fr-FR" dirty="0"/>
+              <a:t>Les </a:t>
+            </a:r>
+            <a:r>
+              <a:rPr lang="fr-FR" dirty="0" err="1"/>
+              <a:t>métaclasses</a:t>
+            </a:r>
+            <a:r>
+              <a:rPr lang="fr-FR" dirty="0"/>
+              <a:t> </a:t>
+            </a:r>
+          </a:p>
+          <a:p>
+            <a:pPr marL="457200" indent="-457200">
+              <a:buFont typeface="+mj-lt"/>
+              <a:buAutoNum type="arabicPeriod"/>
+            </a:pPr>
+            <a:r>
               <a:rPr lang="fr-FR" dirty="0" smtClean="0">
                 <a:latin typeface="Courier New" panose="02070309020205020404" pitchFamily="49" charset="0"/>
                 <a:ea typeface="Calibri" charset="0"/>
@@ -12897,36 +12911,16 @@
             </a:pPr>
             <a:r>
               <a:rPr lang="fr-FR" dirty="0" smtClean="0"/>
-              <a:t>Les </a:t>
-            </a:r>
-            <a:r>
-              <a:rPr lang="fr-FR" dirty="0" err="1"/>
-              <a:t>métaclasses</a:t>
+              <a:t>Conclusion </a:t>
             </a:r>
             <a:r>
               <a:rPr lang="fr-FR" dirty="0"/>
-              <a:t> </a:t>
-            </a:r>
-            <a:endParaRPr lang="fr-FR" dirty="0" smtClean="0"/>
-          </a:p>
-          <a:p>
-            <a:pPr marL="457200" indent="-457200">
-              <a:buFont typeface="+mj-lt"/>
-              <a:buAutoNum type="arabicPeriod"/>
-            </a:pPr>
+              <a:t>du </a:t>
+            </a:r>
             <a:r>
               <a:rPr lang="fr-FR" dirty="0" smtClean="0"/>
-              <a:t>Conclusion </a:t>
-            </a:r>
-            <a:r>
-              <a:rPr lang="fr-FR"/>
-              <a:t>du </a:t>
-            </a:r>
-            <a:r>
-              <a:rPr lang="fr-FR" smtClean="0"/>
               <a:t>MOOC</a:t>
             </a:r>
-            <a:endParaRPr lang="fr-FR" dirty="0" smtClean="0"/>
           </a:p>
         </p:txBody>
       </p:sp>

</xml_diff>

<commit_message>
changed the w9-s6 sequence title
</commit_message>
<xml_diff>
--- a/CONTENTS.pptx
+++ b/CONTENTS.pptx
@@ -12747,13 +12747,15 @@
             </a:pPr>
             <a:r>
               <a:rPr lang="fr-FR" dirty="0">
-                <a:latin typeface="Calibri" charset="0"/>
+                <a:latin typeface="+mj-lt"/>
                 <a:ea typeface="Calibri" charset="0"/>
                 <a:cs typeface="Calibri" charset="0"/>
               </a:rPr>
               <a:t>Les clôtures de fonctions</a:t>
             </a:r>
-            <a:endParaRPr lang="fr-FR" dirty="0" smtClean="0"/>
+            <a:endParaRPr lang="fr-FR" dirty="0" smtClean="0">
+              <a:latin typeface="+mj-lt"/>
+            </a:endParaRPr>
           </a:p>
           <a:p>
             <a:pPr marL="457200" indent="-457200">
@@ -12836,7 +12838,7 @@
               <a:t>, </a:t>
             </a:r>
             <a:r>
-              <a:rPr lang="fr-FR" dirty="0" smtClean="0">
+              <a:rPr lang="fr-FR" dirty="0">
                 <a:latin typeface="Courier New" panose="02070309020205020404" pitchFamily="49" charset="0"/>
                 <a:ea typeface="Calibri" charset="0"/>
                 <a:cs typeface="Courier New" panose="02070309020205020404" pitchFamily="49" charset="0"/>
@@ -12849,23 +12851,15 @@
                 <a:ea typeface="Calibri" charset="0"/>
                 <a:cs typeface="Courier New" panose="02070309020205020404" pitchFamily="49" charset="0"/>
               </a:rPr>
-              <a:t>getattr</a:t>
-            </a:r>
-            <a:r>
-              <a:rPr lang="fr-FR" dirty="0" smtClean="0">
+              <a:t>setattr</a:t>
+            </a:r>
+            <a:r>
+              <a:rPr lang="fr-FR" dirty="0">
                 <a:latin typeface="Courier New" panose="02070309020205020404" pitchFamily="49" charset="0"/>
                 <a:ea typeface="Calibri" charset="0"/>
                 <a:cs typeface="Courier New" panose="02070309020205020404" pitchFamily="49" charset="0"/>
               </a:rPr>
-              <a:t>__</a:t>
-            </a:r>
-            <a:r>
-              <a:rPr lang="fr-FR" dirty="0" smtClean="0">
-                <a:latin typeface="Calibri" charset="0"/>
-                <a:ea typeface="Calibri" charset="0"/>
-                <a:cs typeface="Calibri" charset="0"/>
-              </a:rPr>
-              <a:t> </a:t>
+              <a:t>__ </a:t>
             </a:r>
             <a:r>
               <a:rPr lang="fr-FR" dirty="0">
@@ -12889,7 +12883,7 @@
                 <a:ea typeface="Calibri" charset="0"/>
                 <a:cs typeface="Courier New" panose="02070309020205020404" pitchFamily="49" charset="0"/>
               </a:rPr>
-              <a:t>setattr</a:t>
+              <a:t>getattr</a:t>
             </a:r>
             <a:r>
               <a:rPr lang="fr-FR" dirty="0" smtClean="0">

</xml_diff>

<commit_message>
déplacement de séquences en w9
</commit_message>
<xml_diff>
--- a/CONTENTS.pptx
+++ b/CONTENTS.pptx
@@ -12751,11 +12751,16 @@
                 <a:ea typeface="Calibri" charset="0"/>
                 <a:cs typeface="Calibri" charset="0"/>
               </a:rPr>
-              <a:t>Les clôtures de fonctions</a:t>
-            </a:r>
-            <a:endParaRPr lang="fr-FR" dirty="0" smtClean="0">
-              <a:latin typeface="+mj-lt"/>
-            </a:endParaRPr>
+              <a:t>Les clôtures de </a:t>
+            </a:r>
+            <a:r>
+              <a:rPr lang="fr-FR" dirty="0" smtClean="0">
+                <a:latin typeface="+mj-lt"/>
+                <a:ea typeface="Calibri" charset="0"/>
+                <a:cs typeface="Calibri" charset="0"/>
+              </a:rPr>
+              <a:t>fonctions</a:t>
+            </a:r>
           </a:p>
           <a:p>
             <a:pPr marL="457200" indent="-457200">
@@ -12763,24 +12768,20 @@
               <a:buAutoNum type="arabicPeriod"/>
             </a:pPr>
             <a:r>
-              <a:rPr lang="fr-FR" dirty="0" err="1" smtClean="0">
-                <a:latin typeface="Courier New"/>
-                <a:cs typeface="Courier New"/>
-              </a:rPr>
-              <a:t>property</a:t>
-            </a:r>
-            <a:r>
-              <a:rPr lang="fr-FR" dirty="0" smtClean="0"/>
+              <a:rPr lang="fr-FR" dirty="0"/>
+              <a:t>Les </a:t>
+            </a:r>
+            <a:r>
+              <a:rPr lang="fr-FR" dirty="0" err="1"/>
+              <a:t>métaclasses</a:t>
+            </a:r>
+            <a:r>
+              <a:rPr lang="fr-FR" dirty="0"/>
               <a:t> </a:t>
             </a:r>
-            <a:r>
-              <a:rPr lang="fr-FR" dirty="0"/>
-              <a:t>et </a:t>
-            </a:r>
-            <a:r>
-              <a:rPr lang="fr-FR" dirty="0" smtClean="0"/>
-              <a:t>descripteurs</a:t>
-            </a:r>
+            <a:endParaRPr lang="fr-FR" dirty="0" smtClean="0">
+              <a:latin typeface="+mj-lt"/>
+            </a:endParaRPr>
           </a:p>
           <a:p>
             <a:pPr marL="457200" indent="-457200">
@@ -12788,16 +12789,23 @@
               <a:buAutoNum type="arabicPeriod"/>
             </a:pPr>
             <a:r>
+              <a:rPr lang="fr-FR" dirty="0" err="1" smtClean="0">
+                <a:latin typeface="Courier New"/>
+                <a:cs typeface="Courier New"/>
+              </a:rPr>
+              <a:t>property</a:t>
+            </a:r>
+            <a:r>
+              <a:rPr lang="fr-FR" dirty="0" smtClean="0"/>
+              <a:t> </a:t>
+            </a:r>
+            <a:r>
               <a:rPr lang="fr-FR" dirty="0"/>
-              <a:t>Les </a:t>
-            </a:r>
-            <a:r>
-              <a:rPr lang="fr-FR" dirty="0" err="1"/>
-              <a:t>métaclasses</a:t>
-            </a:r>
-            <a:r>
-              <a:rPr lang="fr-FR" dirty="0"/>
-              <a:t> </a:t>
+              <a:t>et </a:t>
+            </a:r>
+            <a:r>
+              <a:rPr lang="fr-FR" dirty="0" smtClean="0"/>
+              <a:t>descripteurs</a:t>
             </a:r>
           </a:p>
           <a:p>

</xml_diff>